<commit_message>
chore(samples): remove hero assets
</commit_message>
<xml_diff>
--- a/samples/templates/templates1.pptx
+++ b/samples/templates/templates1.pptx
@@ -793,6 +793,46 @@
           </a:p>
         </p:txBody>
       </p:sp>
+      <p:sp>
+        <p:nvSpPr>
+          <p:cNvPr id="5" name="コンテンツ プレースホルダー 4">
+            <a:extLst>
+              <a:ext uri="{FF2B5EF4-FFF2-40B4-BE49-F238E27FC236}">
+                <a16:creationId xmlns:a16="http://schemas.microsoft.com/office/drawing/2014/main" id="{7214F02D-2D38-0E5D-6C46-AEA066F785D6}"/>
+              </a:ext>
+            </a:extLst>
+          </p:cNvPr>
+          <p:cNvSpPr>
+            <a:spLocks noGrp="1"/>
+          </p:cNvSpPr>
+          <p:nvPr>
+            <p:ph sz="quarter" idx="14" hasCustomPrompt="1"/>
+          </p:nvPr>
+        </p:nvSpPr>
+        <p:spPr>
+          <a:xfrm>
+            <a:off x="10784165" y="635330"/>
+            <a:ext cx="914400" cy="914400"/>
+          </a:xfrm>
+        </p:spPr>
+        <p:txBody>
+          <a:bodyPr/>
+          <a:lstStyle>
+            <a:lvl1pPr marL="0" indent="0">
+              <a:buNone/>
+              <a:defRPr/>
+            </a:lvl1pPr>
+          </a:lstStyle>
+          <a:p>
+            <a:pPr lvl="0"/>
+            <a:r>
+              <a:rPr kumimoji="1" lang="en-US" altLang="ja-JP" dirty="0"/>
+              <a:t>logo</a:t>
+            </a:r>
+            <a:endParaRPr kumimoji="1" lang="ja-JP" altLang="en-US"/>
+          </a:p>
+        </p:txBody>
+      </p:sp>
     </p:spTree>
     <p:extLst>
       <p:ext uri="{BB962C8B-B14F-4D97-AF65-F5344CB8AC3E}">
@@ -1738,7 +1778,7 @@
             </a:extLst>
           </p:cNvPr>
           <p:cNvSpPr>
-            <a:spLocks/>
+            <a:spLocks noGrp="1"/>
           </p:cNvSpPr>
           <p:nvPr>
             <p:ph idx="14"/>

</xml_diff>